<commit_message>
Added prelim information stating git version number used
</commit_message>
<xml_diff>
--- a/presentation.pptx
+++ b/presentation.pptx
@@ -34208,12 +34208,45 @@
           </a:p>
         </p:txBody>
       </p:sp>
+      <p:sp>
+        <p:nvSpPr>
+          <p:cNvPr id="7" name="TextBox 6"/>
+          <p:cNvSpPr txBox="1"/>
+          <p:nvPr/>
+        </p:nvSpPr>
+        <p:spPr>
+          <a:xfrm>
+            <a:off x="6664428" y="5132096"/>
+            <a:ext cx="184666" cy="754053"/>
+          </a:xfrm>
+          <a:prstGeom prst="rect">
+            <a:avLst/>
+          </a:prstGeom>
+          <a:noFill/>
+        </p:spPr>
+        <p:txBody>
+          <a:bodyPr wrap="none" rtlCol="0">
+            <a:spAutoFit/>
+          </a:bodyPr>
+          <a:lstStyle/>
+          <a:p>
+            <a:endParaRPr lang="en-US" dirty="0"/>
+          </a:p>
+        </p:txBody>
+      </p:sp>
     </p:spTree>
   </p:cSld>
   <p:clrMapOvr>
     <a:masterClrMapping/>
   </p:clrMapOvr>
   <p:transition/>
+  <p:timing>
+    <p:tnLst>
+      <p:par>
+        <p:cTn id="1" dur="indefinite" restart="never" nodeType="tmRoot"/>
+      </p:par>
+    </p:tnLst>
+  </p:timing>
 </p:sld>
 </file>
 
@@ -34793,6 +34826,13 @@
     <a:masterClrMapping/>
   </p:clrMapOvr>
   <p:transition/>
+  <p:timing>
+    <p:tnLst>
+      <p:par>
+        <p:cTn id="1" dur="indefinite" restart="never" nodeType="tmRoot"/>
+      </p:par>
+    </p:tnLst>
+  </p:timing>
 </p:sld>
 </file>
 
@@ -35852,6 +35892,13 @@
     <a:masterClrMapping/>
   </p:clrMapOvr>
   <p:transition/>
+  <p:timing>
+    <p:tnLst>
+      <p:par>
+        <p:cTn id="1" dur="indefinite" restart="never" nodeType="tmRoot"/>
+      </p:par>
+    </p:tnLst>
+  </p:timing>
 </p:sld>
 </file>
 
@@ -36660,6 +36707,13 @@
     <a:masterClrMapping/>
   </p:clrMapOvr>
   <p:transition/>
+  <p:timing>
+    <p:tnLst>
+      <p:par>
+        <p:cTn id="1" dur="indefinite" restart="never" nodeType="tmRoot"/>
+      </p:par>
+    </p:tnLst>
+  </p:timing>
 </p:sld>
 </file>
 
@@ -37060,6 +37114,13 @@
     <a:masterClrMapping/>
   </p:clrMapOvr>
   <p:transition/>
+  <p:timing>
+    <p:tnLst>
+      <p:par>
+        <p:cTn id="1" dur="indefinite" restart="never" nodeType="tmRoot"/>
+      </p:par>
+    </p:tnLst>
+  </p:timing>
 </p:sld>
 </file>
 
@@ -37987,6 +38048,13 @@
     <a:masterClrMapping/>
   </p:clrMapOvr>
   <p:transition/>
+  <p:timing>
+    <p:tnLst>
+      <p:par>
+        <p:cTn id="1" dur="indefinite" restart="never" nodeType="tmRoot"/>
+      </p:par>
+    </p:tnLst>
+  </p:timing>
 </p:sld>
 </file>
 
@@ -38591,6 +38659,13 @@
     <a:masterClrMapping/>
   </p:clrMapOvr>
   <p:transition/>
+  <p:timing>
+    <p:tnLst>
+      <p:par>
+        <p:cTn id="1" dur="indefinite" restart="never" nodeType="tmRoot"/>
+      </p:par>
+    </p:tnLst>
+  </p:timing>
 </p:sld>
 </file>
 
@@ -38885,6 +38960,13 @@
     <a:masterClrMapping/>
   </p:clrMapOvr>
   <p:transition/>
+  <p:timing>
+    <p:tnLst>
+      <p:par>
+        <p:cTn id="1" dur="indefinite" restart="never" nodeType="tmRoot"/>
+      </p:par>
+    </p:tnLst>
+  </p:timing>
 </p:sld>
 </file>
 
@@ -39088,6 +39170,13 @@
     <a:masterClrMapping/>
   </p:clrMapOvr>
   <p:transition/>
+  <p:timing>
+    <p:tnLst>
+      <p:par>
+        <p:cTn id="1" dur="indefinite" restart="never" nodeType="tmRoot"/>
+      </p:par>
+    </p:tnLst>
+  </p:timing>
 </p:sld>
 </file>
 
@@ -41530,6 +41619,13 @@
     <a:masterClrMapping/>
   </p:clrMapOvr>
   <p:transition/>
+  <p:timing>
+    <p:tnLst>
+      <p:par>
+        <p:cTn id="1" dur="indefinite" restart="never" nodeType="tmRoot"/>
+      </p:par>
+    </p:tnLst>
+  </p:timing>
 </p:sld>
 </file>
 
@@ -42034,6 +42130,13 @@
     <a:masterClrMapping/>
   </p:clrMapOvr>
   <p:transition/>
+  <p:timing>
+    <p:tnLst>
+      <p:par>
+        <p:cTn id="1" dur="indefinite" restart="never" nodeType="tmRoot"/>
+      </p:par>
+    </p:tnLst>
+  </p:timing>
 </p:sld>
 </file>
 
@@ -42143,6 +42246,13 @@
   <p:clrMapOvr>
     <a:masterClrMapping/>
   </p:clrMapOvr>
+  <p:timing>
+    <p:tnLst>
+      <p:par>
+        <p:cTn id="1" dur="indefinite" restart="never" nodeType="tmRoot"/>
+      </p:par>
+    </p:tnLst>
+  </p:timing>
 </p:sld>
 </file>
 
@@ -44642,6 +44752,13 @@
   <p:clrMapOvr>
     <a:masterClrMapping/>
   </p:clrMapOvr>
+  <p:timing>
+    <p:tnLst>
+      <p:par>
+        <p:cTn id="1" dur="indefinite" restart="never" nodeType="tmRoot"/>
+      </p:par>
+    </p:tnLst>
+  </p:timing>
 </p:sld>
 </file>
 
@@ -44764,6 +44881,13 @@
   <p:clrMapOvr>
     <a:masterClrMapping/>
   </p:clrMapOvr>
+  <p:timing>
+    <p:tnLst>
+      <p:par>
+        <p:cTn id="1" dur="indefinite" restart="never" nodeType="tmRoot"/>
+      </p:par>
+    </p:tnLst>
+  </p:timing>
 </p:sld>
 </file>
 
@@ -50151,6 +50275,13 @@
     <a:masterClrMapping/>
   </p:clrMapOvr>
   <p:transition/>
+  <p:timing>
+    <p:tnLst>
+      <p:par>
+        <p:cTn id="1" dur="indefinite" restart="never" nodeType="tmRoot"/>
+      </p:par>
+    </p:tnLst>
+  </p:timing>
 </p:sld>
 </file>
 
@@ -51959,6 +52090,13 @@
     <a:masterClrMapping/>
   </p:clrMapOvr>
   <p:transition/>
+  <p:timing>
+    <p:tnLst>
+      <p:par>
+        <p:cTn id="1" dur="indefinite" restart="never" nodeType="tmRoot"/>
+      </p:par>
+    </p:tnLst>
+  </p:timing>
 </p:sld>
 </file>
 
@@ -52301,6 +52439,13 @@
     <a:masterClrMapping/>
   </p:clrMapOvr>
   <p:transition/>
+  <p:timing>
+    <p:tnLst>
+      <p:par>
+        <p:cTn id="1" dur="indefinite" restart="never" nodeType="tmRoot"/>
+      </p:par>
+    </p:tnLst>
+  </p:timing>
 </p:sld>
 </file>
 
@@ -52370,6 +52515,21 @@
             <a:endParaRPr lang="en-US" dirty="0" smtClean="0"/>
           </a:p>
           <a:p>
+            <a:pPr lvl="1"/>
+            <a:r>
+              <a:rPr lang="en-US" dirty="0" smtClean="0"/>
+              <a:t>Everything should work for </a:t>
+            </a:r>
+            <a:r>
+              <a:rPr lang="en-US" dirty="0" err="1" smtClean="0"/>
+              <a:t>git</a:t>
+            </a:r>
+            <a:r>
+              <a:rPr lang="en-US" smtClean="0"/>
+              <a:t> 1.6.6</a:t>
+            </a:r>
+          </a:p>
+          <a:p>
             <a:r>
               <a:rPr lang="en-US" dirty="0" smtClean="0"/>
               <a:t>Usage of various commonly used commands</a:t>
@@ -52390,6 +52550,13 @@
     <a:masterClrMapping/>
   </p:clrMapOvr>
   <p:transition/>
+  <p:timing>
+    <p:tnLst>
+      <p:par>
+        <p:cTn id="1" dur="indefinite" restart="never" nodeType="tmRoot"/>
+      </p:par>
+    </p:tnLst>
+  </p:timing>
 </p:sld>
 </file>
 
@@ -52416,6 +52583,13 @@
     <a:masterClrMapping/>
   </p:clrMapOvr>
   <p:transition/>
+  <p:timing>
+    <p:tnLst>
+      <p:par>
+        <p:cTn id="1" dur="indefinite" restart="never" nodeType="tmRoot"/>
+      </p:par>
+    </p:tnLst>
+  </p:timing>
 </p:sld>
 </file>
 
@@ -52546,6 +52720,13 @@
   <p:clrMapOvr>
     <a:masterClrMapping/>
   </p:clrMapOvr>
+  <p:timing>
+    <p:tnLst>
+      <p:par>
+        <p:cTn id="1" dur="indefinite" restart="never" nodeType="tmRoot"/>
+      </p:par>
+    </p:tnLst>
+  </p:timing>
 </p:sld>
 </file>
 
@@ -52731,6 +52912,13 @@
     <a:masterClrMapping/>
   </p:clrMapOvr>
   <p:transition/>
+  <p:timing>
+    <p:tnLst>
+      <p:par>
+        <p:cTn id="1" dur="indefinite" restart="never" nodeType="tmRoot"/>
+      </p:par>
+    </p:tnLst>
+  </p:timing>
 </p:sld>
 </file>
 
@@ -52840,6 +53028,13 @@
   <p:clrMapOvr>
     <a:masterClrMapping/>
   </p:clrMapOvr>
+  <p:timing>
+    <p:tnLst>
+      <p:par>
+        <p:cTn id="1" dur="indefinite" restart="never" nodeType="tmRoot"/>
+      </p:par>
+    </p:tnLst>
+  </p:timing>
 </p:sld>
 </file>
 
@@ -53322,6 +53517,13 @@
     <a:masterClrMapping/>
   </p:clrMapOvr>
   <p:transition/>
+  <p:timing>
+    <p:tnLst>
+      <p:par>
+        <p:cTn id="1" dur="indefinite" restart="never" nodeType="tmRoot"/>
+      </p:par>
+    </p:tnLst>
+  </p:timing>
 </p:sld>
 </file>
 
@@ -53699,6 +53901,13 @@
     <a:masterClrMapping/>
   </p:clrMapOvr>
   <p:transition/>
+  <p:timing>
+    <p:tnLst>
+      <p:par>
+        <p:cTn id="1" dur="indefinite" restart="never" nodeType="tmRoot"/>
+      </p:par>
+    </p:tnLst>
+  </p:timing>
 </p:sld>
 </file>
 

</xml_diff>